<commit_message>
Final updates to project before presenting
</commit_message>
<xml_diff>
--- a/data2/Presentation1 copy.pptx
+++ b/data2/Presentation1 copy.pptx
@@ -4,6 +4,9 @@
   <p:sldMasterIdLst>
     <p:sldMasterId id="2147483648" r:id="rId1"/>
   </p:sldMasterIdLst>
+  <p:notesMasterIdLst>
+    <p:notesMasterId r:id="rId14"/>
+  </p:notesMasterIdLst>
   <p:sldIdLst>
     <p:sldId id="256" r:id="rId2"/>
     <p:sldId id="257" r:id="rId3"/>
@@ -14,8 +17,9 @@
     <p:sldId id="269" r:id="rId8"/>
     <p:sldId id="270" r:id="rId9"/>
     <p:sldId id="267" r:id="rId10"/>
-    <p:sldId id="268" r:id="rId11"/>
-    <p:sldId id="264" r:id="rId12"/>
+    <p:sldId id="271" r:id="rId11"/>
+    <p:sldId id="268" r:id="rId12"/>
+    <p:sldId id="264" r:id="rId13"/>
   </p:sldIdLst>
   <p:sldSz cx="12192000" cy="6858000"/>
   <p:notesSz cx="6858000" cy="9144000"/>
@@ -114,7 +118,445 @@
       </a:defRPr>
     </a:lvl9pPr>
   </p:defaultTextStyle>
+  <p:extLst>
+    <p:ext uri="{EFAFB233-063F-42B5-8137-9DF3F51BA10A}">
+      <p15:sldGuideLst xmlns:p15="http://schemas.microsoft.com/office/powerpoint/2012/main"/>
+    </p:ext>
+  </p:extLst>
 </p:presentation>
+</file>
+
+<file path=ppt/notesMasters/notesMaster1.xml><?xml version="1.0" encoding="utf-8"?>
+<p:notesMaster xmlns:a="http://schemas.openxmlformats.org/drawingml/2006/main" xmlns:r="http://schemas.openxmlformats.org/officeDocument/2006/relationships" xmlns:p="http://schemas.openxmlformats.org/presentationml/2006/main">
+  <p:cSld>
+    <p:bg>
+      <p:bgRef idx="1001">
+        <a:schemeClr val="bg1"/>
+      </p:bgRef>
+    </p:bg>
+    <p:spTree>
+      <p:nvGrpSpPr>
+        <p:cNvPr id="1" name=""/>
+        <p:cNvGrpSpPr/>
+        <p:nvPr/>
+      </p:nvGrpSpPr>
+      <p:grpSpPr>
+        <a:xfrm>
+          <a:off x="0" y="0"/>
+          <a:ext cx="0" cy="0"/>
+          <a:chOff x="0" y="0"/>
+          <a:chExt cx="0" cy="0"/>
+        </a:xfrm>
+      </p:grpSpPr>
+      <p:sp>
+        <p:nvSpPr>
+          <p:cNvPr id="2" name="Header Placeholder 1"/>
+          <p:cNvSpPr>
+            <a:spLocks noGrp="1"/>
+          </p:cNvSpPr>
+          <p:nvPr>
+            <p:ph type="hdr" sz="quarter"/>
+          </p:nvPr>
+        </p:nvSpPr>
+        <p:spPr>
+          <a:xfrm>
+            <a:off x="0" y="0"/>
+            <a:ext cx="2971800" cy="458788"/>
+          </a:xfrm>
+          <a:prstGeom prst="rect">
+            <a:avLst/>
+          </a:prstGeom>
+        </p:spPr>
+        <p:txBody>
+          <a:bodyPr vert="horz" lIns="91440" tIns="45720" rIns="91440" bIns="45720" rtlCol="0"/>
+          <a:lstStyle>
+            <a:lvl1pPr algn="l">
+              <a:defRPr sz="1200"/>
+            </a:lvl1pPr>
+          </a:lstStyle>
+          <a:p>
+            <a:endParaRPr lang="en-US"/>
+          </a:p>
+        </p:txBody>
+      </p:sp>
+      <p:sp>
+        <p:nvSpPr>
+          <p:cNvPr id="3" name="Date Placeholder 2"/>
+          <p:cNvSpPr>
+            <a:spLocks noGrp="1"/>
+          </p:cNvSpPr>
+          <p:nvPr>
+            <p:ph type="dt" idx="1"/>
+          </p:nvPr>
+        </p:nvSpPr>
+        <p:spPr>
+          <a:xfrm>
+            <a:off x="3884613" y="0"/>
+            <a:ext cx="2971800" cy="458788"/>
+          </a:xfrm>
+          <a:prstGeom prst="rect">
+            <a:avLst/>
+          </a:prstGeom>
+        </p:spPr>
+        <p:txBody>
+          <a:bodyPr vert="horz" lIns="91440" tIns="45720" rIns="91440" bIns="45720" rtlCol="0"/>
+          <a:lstStyle>
+            <a:lvl1pPr algn="r">
+              <a:defRPr sz="1200"/>
+            </a:lvl1pPr>
+          </a:lstStyle>
+          <a:p>
+            <a:fld id="{B57A1FD4-5FFE-F244-B60D-1839E2764B32}" type="datetimeFigureOut">
+              <a:rPr lang="en-US" smtClean="0"/>
+              <a:t>8/21/24</a:t>
+            </a:fld>
+            <a:endParaRPr lang="en-US"/>
+          </a:p>
+        </p:txBody>
+      </p:sp>
+      <p:sp>
+        <p:nvSpPr>
+          <p:cNvPr id="4" name="Slide Image Placeholder 3"/>
+          <p:cNvSpPr>
+            <a:spLocks noGrp="1" noRot="1" noChangeAspect="1"/>
+          </p:cNvSpPr>
+          <p:nvPr>
+            <p:ph type="sldImg" idx="2"/>
+          </p:nvPr>
+        </p:nvSpPr>
+        <p:spPr>
+          <a:xfrm>
+            <a:off x="685800" y="1143000"/>
+            <a:ext cx="5486400" cy="3086100"/>
+          </a:xfrm>
+          <a:prstGeom prst="rect">
+            <a:avLst/>
+          </a:prstGeom>
+          <a:noFill/>
+          <a:ln w="12700">
+            <a:solidFill>
+              <a:prstClr val="black"/>
+            </a:solidFill>
+          </a:ln>
+        </p:spPr>
+        <p:txBody>
+          <a:bodyPr vert="horz" lIns="91440" tIns="45720" rIns="91440" bIns="45720" rtlCol="0" anchor="ctr"/>
+          <a:lstStyle/>
+          <a:p>
+            <a:endParaRPr lang="en-US"/>
+          </a:p>
+        </p:txBody>
+      </p:sp>
+      <p:sp>
+        <p:nvSpPr>
+          <p:cNvPr id="5" name="Notes Placeholder 4"/>
+          <p:cNvSpPr>
+            <a:spLocks noGrp="1"/>
+          </p:cNvSpPr>
+          <p:nvPr>
+            <p:ph type="body" sz="quarter" idx="3"/>
+          </p:nvPr>
+        </p:nvSpPr>
+        <p:spPr>
+          <a:xfrm>
+            <a:off x="685800" y="4400550"/>
+            <a:ext cx="5486400" cy="3600450"/>
+          </a:xfrm>
+          <a:prstGeom prst="rect">
+            <a:avLst/>
+          </a:prstGeom>
+        </p:spPr>
+        <p:txBody>
+          <a:bodyPr vert="horz" lIns="91440" tIns="45720" rIns="91440" bIns="45720" rtlCol="0"/>
+          <a:lstStyle/>
+          <a:p>
+            <a:pPr lvl="0"/>
+            <a:r>
+              <a:rPr lang="en-US"/>
+              <a:t>Click to edit Master text styles</a:t>
+            </a:r>
+          </a:p>
+          <a:p>
+            <a:pPr lvl="1"/>
+            <a:r>
+              <a:rPr lang="en-US"/>
+              <a:t>Second level</a:t>
+            </a:r>
+          </a:p>
+          <a:p>
+            <a:pPr lvl="2"/>
+            <a:r>
+              <a:rPr lang="en-US"/>
+              <a:t>Third level</a:t>
+            </a:r>
+          </a:p>
+          <a:p>
+            <a:pPr lvl="3"/>
+            <a:r>
+              <a:rPr lang="en-US"/>
+              <a:t>Fourth level</a:t>
+            </a:r>
+          </a:p>
+          <a:p>
+            <a:pPr lvl="4"/>
+            <a:r>
+              <a:rPr lang="en-US"/>
+              <a:t>Fifth level</a:t>
+            </a:r>
+          </a:p>
+        </p:txBody>
+      </p:sp>
+      <p:sp>
+        <p:nvSpPr>
+          <p:cNvPr id="6" name="Footer Placeholder 5"/>
+          <p:cNvSpPr>
+            <a:spLocks noGrp="1"/>
+          </p:cNvSpPr>
+          <p:nvPr>
+            <p:ph type="ftr" sz="quarter" idx="4"/>
+          </p:nvPr>
+        </p:nvSpPr>
+        <p:spPr>
+          <a:xfrm>
+            <a:off x="0" y="8685213"/>
+            <a:ext cx="2971800" cy="458787"/>
+          </a:xfrm>
+          <a:prstGeom prst="rect">
+            <a:avLst/>
+          </a:prstGeom>
+        </p:spPr>
+        <p:txBody>
+          <a:bodyPr vert="horz" lIns="91440" tIns="45720" rIns="91440" bIns="45720" rtlCol="0" anchor="b"/>
+          <a:lstStyle>
+            <a:lvl1pPr algn="l">
+              <a:defRPr sz="1200"/>
+            </a:lvl1pPr>
+          </a:lstStyle>
+          <a:p>
+            <a:endParaRPr lang="en-US"/>
+          </a:p>
+        </p:txBody>
+      </p:sp>
+      <p:sp>
+        <p:nvSpPr>
+          <p:cNvPr id="7" name="Slide Number Placeholder 6"/>
+          <p:cNvSpPr>
+            <a:spLocks noGrp="1"/>
+          </p:cNvSpPr>
+          <p:nvPr>
+            <p:ph type="sldNum" sz="quarter" idx="5"/>
+          </p:nvPr>
+        </p:nvSpPr>
+        <p:spPr>
+          <a:xfrm>
+            <a:off x="3884613" y="8685213"/>
+            <a:ext cx="2971800" cy="458787"/>
+          </a:xfrm>
+          <a:prstGeom prst="rect">
+            <a:avLst/>
+          </a:prstGeom>
+        </p:spPr>
+        <p:txBody>
+          <a:bodyPr vert="horz" lIns="91440" tIns="45720" rIns="91440" bIns="45720" rtlCol="0" anchor="b"/>
+          <a:lstStyle>
+            <a:lvl1pPr algn="r">
+              <a:defRPr sz="1200"/>
+            </a:lvl1pPr>
+          </a:lstStyle>
+          <a:p>
+            <a:fld id="{E48081DF-1CE1-314D-8F76-24A4D4D0C8D1}" type="slidenum">
+              <a:rPr lang="en-US" smtClean="0"/>
+              <a:t>‹#›</a:t>
+            </a:fld>
+            <a:endParaRPr lang="en-US"/>
+          </a:p>
+        </p:txBody>
+      </p:sp>
+    </p:spTree>
+    <p:extLst>
+      <p:ext uri="{BB962C8B-B14F-4D97-AF65-F5344CB8AC3E}">
+        <p14:creationId xmlns:p14="http://schemas.microsoft.com/office/powerpoint/2010/main" val="576162814"/>
+      </p:ext>
+    </p:extLst>
+  </p:cSld>
+  <p:clrMap bg1="lt1" tx1="dk1" bg2="lt2" tx2="dk2" accent1="accent1" accent2="accent2" accent3="accent3" accent4="accent4" accent5="accent5" accent6="accent6" hlink="hlink" folHlink="folHlink"/>
+  <p:notesStyle>
+    <a:lvl1pPr marL="0" algn="l" defTabSz="914400" rtl="0" eaLnBrk="1" latinLnBrk="0" hangingPunct="1">
+      <a:defRPr sz="1200" kern="1200">
+        <a:solidFill>
+          <a:schemeClr val="tx1"/>
+        </a:solidFill>
+        <a:latin typeface="+mn-lt"/>
+        <a:ea typeface="+mn-ea"/>
+        <a:cs typeface="+mn-cs"/>
+      </a:defRPr>
+    </a:lvl1pPr>
+    <a:lvl2pPr marL="457200" algn="l" defTabSz="914400" rtl="0" eaLnBrk="1" latinLnBrk="0" hangingPunct="1">
+      <a:defRPr sz="1200" kern="1200">
+        <a:solidFill>
+          <a:schemeClr val="tx1"/>
+        </a:solidFill>
+        <a:latin typeface="+mn-lt"/>
+        <a:ea typeface="+mn-ea"/>
+        <a:cs typeface="+mn-cs"/>
+      </a:defRPr>
+    </a:lvl2pPr>
+    <a:lvl3pPr marL="914400" algn="l" defTabSz="914400" rtl="0" eaLnBrk="1" latinLnBrk="0" hangingPunct="1">
+      <a:defRPr sz="1200" kern="1200">
+        <a:solidFill>
+          <a:schemeClr val="tx1"/>
+        </a:solidFill>
+        <a:latin typeface="+mn-lt"/>
+        <a:ea typeface="+mn-ea"/>
+        <a:cs typeface="+mn-cs"/>
+      </a:defRPr>
+    </a:lvl3pPr>
+    <a:lvl4pPr marL="1371600" algn="l" defTabSz="914400" rtl="0" eaLnBrk="1" latinLnBrk="0" hangingPunct="1">
+      <a:defRPr sz="1200" kern="1200">
+        <a:solidFill>
+          <a:schemeClr val="tx1"/>
+        </a:solidFill>
+        <a:latin typeface="+mn-lt"/>
+        <a:ea typeface="+mn-ea"/>
+        <a:cs typeface="+mn-cs"/>
+      </a:defRPr>
+    </a:lvl4pPr>
+    <a:lvl5pPr marL="1828800" algn="l" defTabSz="914400" rtl="0" eaLnBrk="1" latinLnBrk="0" hangingPunct="1">
+      <a:defRPr sz="1200" kern="1200">
+        <a:solidFill>
+          <a:schemeClr val="tx1"/>
+        </a:solidFill>
+        <a:latin typeface="+mn-lt"/>
+        <a:ea typeface="+mn-ea"/>
+        <a:cs typeface="+mn-cs"/>
+      </a:defRPr>
+    </a:lvl5pPr>
+    <a:lvl6pPr marL="2286000" algn="l" defTabSz="914400" rtl="0" eaLnBrk="1" latinLnBrk="0" hangingPunct="1">
+      <a:defRPr sz="1200" kern="1200">
+        <a:solidFill>
+          <a:schemeClr val="tx1"/>
+        </a:solidFill>
+        <a:latin typeface="+mn-lt"/>
+        <a:ea typeface="+mn-ea"/>
+        <a:cs typeface="+mn-cs"/>
+      </a:defRPr>
+    </a:lvl6pPr>
+    <a:lvl7pPr marL="2743200" algn="l" defTabSz="914400" rtl="0" eaLnBrk="1" latinLnBrk="0" hangingPunct="1">
+      <a:defRPr sz="1200" kern="1200">
+        <a:solidFill>
+          <a:schemeClr val="tx1"/>
+        </a:solidFill>
+        <a:latin typeface="+mn-lt"/>
+        <a:ea typeface="+mn-ea"/>
+        <a:cs typeface="+mn-cs"/>
+      </a:defRPr>
+    </a:lvl7pPr>
+    <a:lvl8pPr marL="3200400" algn="l" defTabSz="914400" rtl="0" eaLnBrk="1" latinLnBrk="0" hangingPunct="1">
+      <a:defRPr sz="1200" kern="1200">
+        <a:solidFill>
+          <a:schemeClr val="tx1"/>
+        </a:solidFill>
+        <a:latin typeface="+mn-lt"/>
+        <a:ea typeface="+mn-ea"/>
+        <a:cs typeface="+mn-cs"/>
+      </a:defRPr>
+    </a:lvl8pPr>
+    <a:lvl9pPr marL="3657600" algn="l" defTabSz="914400" rtl="0" eaLnBrk="1" latinLnBrk="0" hangingPunct="1">
+      <a:defRPr sz="1200" kern="1200">
+        <a:solidFill>
+          <a:schemeClr val="tx1"/>
+        </a:solidFill>
+        <a:latin typeface="+mn-lt"/>
+        <a:ea typeface="+mn-ea"/>
+        <a:cs typeface="+mn-cs"/>
+      </a:defRPr>
+    </a:lvl9pPr>
+  </p:notesStyle>
+</p:notesMaster>
+</file>
+
+<file path=ppt/notesSlides/notesSlide1.xml><?xml version="1.0" encoding="utf-8"?>
+<p:notes xmlns:a="http://schemas.openxmlformats.org/drawingml/2006/main" xmlns:r="http://schemas.openxmlformats.org/officeDocument/2006/relationships" xmlns:p="http://schemas.openxmlformats.org/presentationml/2006/main">
+  <p:cSld>
+    <p:spTree>
+      <p:nvGrpSpPr>
+        <p:cNvPr id="1" name=""/>
+        <p:cNvGrpSpPr/>
+        <p:nvPr/>
+      </p:nvGrpSpPr>
+      <p:grpSpPr>
+        <a:xfrm>
+          <a:off x="0" y="0"/>
+          <a:ext cx="0" cy="0"/>
+          <a:chOff x="0" y="0"/>
+          <a:chExt cx="0" cy="0"/>
+        </a:xfrm>
+      </p:grpSpPr>
+      <p:sp>
+        <p:nvSpPr>
+          <p:cNvPr id="2" name="Slide Image Placeholder 1"/>
+          <p:cNvSpPr>
+            <a:spLocks noGrp="1" noRot="1" noChangeAspect="1"/>
+          </p:cNvSpPr>
+          <p:nvPr>
+            <p:ph type="sldImg"/>
+          </p:nvPr>
+        </p:nvSpPr>
+        <p:spPr/>
+      </p:sp>
+      <p:sp>
+        <p:nvSpPr>
+          <p:cNvPr id="3" name="Notes Placeholder 2"/>
+          <p:cNvSpPr>
+            <a:spLocks noGrp="1"/>
+          </p:cNvSpPr>
+          <p:nvPr>
+            <p:ph type="body" idx="1"/>
+          </p:nvPr>
+        </p:nvSpPr>
+        <p:spPr/>
+        <p:txBody>
+          <a:bodyPr/>
+          <a:lstStyle/>
+          <a:p>
+            <a:endParaRPr lang="en-US" dirty="0"/>
+          </a:p>
+        </p:txBody>
+      </p:sp>
+      <p:sp>
+        <p:nvSpPr>
+          <p:cNvPr id="4" name="Slide Number Placeholder 3"/>
+          <p:cNvSpPr>
+            <a:spLocks noGrp="1"/>
+          </p:cNvSpPr>
+          <p:nvPr>
+            <p:ph type="sldNum" sz="quarter" idx="5"/>
+          </p:nvPr>
+        </p:nvSpPr>
+        <p:spPr/>
+        <p:txBody>
+          <a:bodyPr/>
+          <a:lstStyle/>
+          <a:p>
+            <a:fld id="{E48081DF-1CE1-314D-8F76-24A4D4D0C8D1}" type="slidenum">
+              <a:rPr lang="en-US" smtClean="0"/>
+              <a:t>11</a:t>
+            </a:fld>
+            <a:endParaRPr lang="en-US"/>
+          </a:p>
+        </p:txBody>
+      </p:sp>
+    </p:spTree>
+    <p:extLst>
+      <p:ext uri="{BB962C8B-B14F-4D97-AF65-F5344CB8AC3E}">
+        <p14:creationId xmlns:p14="http://schemas.microsoft.com/office/powerpoint/2010/main" val="1309600059"/>
+      </p:ext>
+    </p:extLst>
+  </p:cSld>
+  <p:clrMapOvr>
+    <a:masterClrMapping/>
+  </p:clrMapOvr>
+</p:notes>
 </file>
 
 <file path=ppt/slideLayouts/slideLayout1.xml><?xml version="1.0" encoding="utf-8"?>
@@ -264,7 +706,7 @@
           <a:p>
             <a:fld id="{4165C235-A247-FE4E-814C-E81864CF499B}" type="datetimeFigureOut">
               <a:rPr lang="en-US" smtClean="0"/>
-              <a:t>8/9/24</a:t>
+              <a:t>8/21/24</a:t>
             </a:fld>
             <a:endParaRPr lang="en-US"/>
           </a:p>
@@ -462,7 +904,7 @@
           <a:p>
             <a:fld id="{4165C235-A247-FE4E-814C-E81864CF499B}" type="datetimeFigureOut">
               <a:rPr lang="en-US" smtClean="0"/>
-              <a:t>8/9/24</a:t>
+              <a:t>8/21/24</a:t>
             </a:fld>
             <a:endParaRPr lang="en-US"/>
           </a:p>
@@ -670,7 +1112,7 @@
           <a:p>
             <a:fld id="{4165C235-A247-FE4E-814C-E81864CF499B}" type="datetimeFigureOut">
               <a:rPr lang="en-US" smtClean="0"/>
-              <a:t>8/9/24</a:t>
+              <a:t>8/21/24</a:t>
             </a:fld>
             <a:endParaRPr lang="en-US"/>
           </a:p>
@@ -868,7 +1310,7 @@
           <a:p>
             <a:fld id="{4165C235-A247-FE4E-814C-E81864CF499B}" type="datetimeFigureOut">
               <a:rPr lang="en-US" smtClean="0"/>
-              <a:t>8/9/24</a:t>
+              <a:t>8/21/24</a:t>
             </a:fld>
             <a:endParaRPr lang="en-US"/>
           </a:p>
@@ -1143,7 +1585,7 @@
           <a:p>
             <a:fld id="{4165C235-A247-FE4E-814C-E81864CF499B}" type="datetimeFigureOut">
               <a:rPr lang="en-US" smtClean="0"/>
-              <a:t>8/9/24</a:t>
+              <a:t>8/21/24</a:t>
             </a:fld>
             <a:endParaRPr lang="en-US"/>
           </a:p>
@@ -1408,7 +1850,7 @@
           <a:p>
             <a:fld id="{4165C235-A247-FE4E-814C-E81864CF499B}" type="datetimeFigureOut">
               <a:rPr lang="en-US" smtClean="0"/>
-              <a:t>8/9/24</a:t>
+              <a:t>8/21/24</a:t>
             </a:fld>
             <a:endParaRPr lang="en-US"/>
           </a:p>
@@ -1820,7 +2262,7 @@
           <a:p>
             <a:fld id="{4165C235-A247-FE4E-814C-E81864CF499B}" type="datetimeFigureOut">
               <a:rPr lang="en-US" smtClean="0"/>
-              <a:t>8/9/24</a:t>
+              <a:t>8/21/24</a:t>
             </a:fld>
             <a:endParaRPr lang="en-US"/>
           </a:p>
@@ -1961,7 +2403,7 @@
           <a:p>
             <a:fld id="{4165C235-A247-FE4E-814C-E81864CF499B}" type="datetimeFigureOut">
               <a:rPr lang="en-US" smtClean="0"/>
-              <a:t>8/9/24</a:t>
+              <a:t>8/21/24</a:t>
             </a:fld>
             <a:endParaRPr lang="en-US"/>
           </a:p>
@@ -2074,7 +2516,7 @@
           <a:p>
             <a:fld id="{4165C235-A247-FE4E-814C-E81864CF499B}" type="datetimeFigureOut">
               <a:rPr lang="en-US" smtClean="0"/>
-              <a:t>8/9/24</a:t>
+              <a:t>8/21/24</a:t>
             </a:fld>
             <a:endParaRPr lang="en-US"/>
           </a:p>
@@ -2385,7 +2827,7 @@
           <a:p>
             <a:fld id="{4165C235-A247-FE4E-814C-E81864CF499B}" type="datetimeFigureOut">
               <a:rPr lang="en-US" smtClean="0"/>
-              <a:t>8/9/24</a:t>
+              <a:t>8/21/24</a:t>
             </a:fld>
             <a:endParaRPr lang="en-US"/>
           </a:p>
@@ -2673,7 +3115,7 @@
           <a:p>
             <a:fld id="{4165C235-A247-FE4E-814C-E81864CF499B}" type="datetimeFigureOut">
               <a:rPr lang="en-US" smtClean="0"/>
-              <a:t>8/9/24</a:t>
+              <a:t>8/21/24</a:t>
             </a:fld>
             <a:endParaRPr lang="en-US"/>
           </a:p>
@@ -2914,7 +3356,7 @@
           <a:p>
             <a:fld id="{4165C235-A247-FE4E-814C-E81864CF499B}" type="datetimeFigureOut">
               <a:rPr lang="en-US" smtClean="0"/>
-              <a:t>8/9/24</a:t>
+              <a:t>8/21/24</a:t>
             </a:fld>
             <a:endParaRPr lang="en-US"/>
           </a:p>
@@ -3598,7 +4040,7 @@
         </p:nvSpPr>
         <p:spPr>
           <a:xfrm>
-            <a:off x="6755735" y="3146926"/>
+            <a:off x="6760067" y="2389796"/>
             <a:ext cx="5053066" cy="874858"/>
           </a:xfrm>
         </p:spPr>
@@ -3608,9 +4050,10 @@
           </a:bodyPr>
           <a:lstStyle/>
           <a:p>
+            <a:pPr algn="l"/>
             <a:r>
               <a:rPr lang="en-US" sz="2000" dirty="0"/>
-              <a:t>Minimizing stakeholder risk of selecting a new Jet-plane operation to invest in. </a:t>
+              <a:t>Minimizing stakeholder investment risk through data analysis.</a:t>
             </a:r>
           </a:p>
         </p:txBody>
@@ -3629,7 +4072,7 @@
         </p:nvSpPr>
         <p:spPr>
           <a:xfrm>
-            <a:off x="6943003" y="4021784"/>
+            <a:off x="6755735" y="5465574"/>
             <a:ext cx="5057398" cy="874859"/>
           </a:xfrm>
           <a:prstGeom prst="rect">
@@ -3784,7 +4227,7 @@
           <a:lstStyle/>
           <a:p>
             <a:r>
-              <a:rPr lang="en-US" kern="1200">
+              <a:rPr lang="en-US" kern="1200" dirty="0">
                 <a:solidFill>
                   <a:schemeClr val="tx1"/>
                 </a:solidFill>
@@ -3792,7 +4235,7 @@
                 <a:ea typeface="+mj-ea"/>
                 <a:cs typeface="+mj-cs"/>
               </a:rPr>
-              <a:t>Conclusions and Next Steps</a:t>
+              <a:t>Conclusions</a:t>
             </a:r>
           </a:p>
         </p:txBody>
@@ -3960,53 +4403,6 @@
       </p:sp>
       <p:sp>
         <p:nvSpPr>
-          <p:cNvPr id="6" name="Text Placeholder 5">
-            <a:extLst>
-              <a:ext uri="{FF2B5EF4-FFF2-40B4-BE49-F238E27FC236}">
-                <a16:creationId xmlns:a16="http://schemas.microsoft.com/office/drawing/2014/main" id="{E6844C07-DA04-064A-F835-B8F6BC726540}"/>
-              </a:ext>
-            </a:extLst>
-          </p:cNvPr>
-          <p:cNvSpPr>
-            <a:spLocks/>
-          </p:cNvSpPr>
-          <p:nvPr/>
-        </p:nvSpPr>
-        <p:spPr>
-          <a:xfrm>
-            <a:off x="838200" y="1785892"/>
-            <a:ext cx="4934825" cy="788296"/>
-          </a:xfrm>
-          <a:prstGeom prst="rect">
-            <a:avLst/>
-          </a:prstGeom>
-        </p:spPr>
-        <p:txBody>
-          <a:bodyPr/>
-          <a:lstStyle/>
-          <a:p>
-            <a:pPr defTabSz="868680">
-              <a:spcAft>
-                <a:spcPts val="600"/>
-              </a:spcAft>
-            </a:pPr>
-            <a:r>
-              <a:rPr lang="en-US" sz="1710" kern="1200">
-                <a:solidFill>
-                  <a:schemeClr val="tx1"/>
-                </a:solidFill>
-                <a:latin typeface="+mn-lt"/>
-                <a:ea typeface="+mn-ea"/>
-                <a:cs typeface="+mn-cs"/>
-              </a:rPr>
-              <a:t>Conclusions</a:t>
-            </a:r>
-            <a:endParaRPr lang="en-US"/>
-          </a:p>
-        </p:txBody>
-      </p:sp>
-      <p:sp>
-        <p:nvSpPr>
           <p:cNvPr id="7" name="Content Placeholder 6">
             <a:extLst>
               <a:ext uri="{FF2B5EF4-FFF2-40B4-BE49-F238E27FC236}">
@@ -4070,7 +4466,7 @@
                 <a:ea typeface="+mn-ea"/>
                 <a:cs typeface="+mn-cs"/>
               </a:rPr>
-              <a:t>Invest in Jet operations with larger commercial passenger carrying capacities. </a:t>
+              <a:t>Invest in Jet operations with medium commercial passenger carrying capacities. </a:t>
             </a:r>
           </a:p>
           <a:p>
@@ -4095,7 +4491,12 @@
               </a:rPr>
               <a:t>Invest in Jets that utilize Turbo Jet Engines as a method of propulsion.</a:t>
             </a:r>
-            <a:endParaRPr lang="en-US" dirty="0"/>
+            <a:endParaRPr lang="en-US" sz="1710" dirty="0">
+              <a:highlight>
+                <a:srgbClr val="FFFFFF"/>
+              </a:highlight>
+              <a:latin typeface="system-ui"/>
+            </a:endParaRPr>
           </a:p>
         </p:txBody>
       </p:sp>
@@ -4115,8 +4516,8 @@
         </p:nvSpPr>
         <p:spPr>
           <a:xfrm>
-            <a:off x="5940100" y="1785892"/>
-            <a:ext cx="5404556" cy="788296"/>
+            <a:off x="5955024" y="2574188"/>
+            <a:ext cx="5404556" cy="1931796"/>
           </a:xfrm>
           <a:prstGeom prst="rect">
             <a:avLst/>
@@ -4132,17 +4533,15 @@
               </a:spcAft>
             </a:pPr>
             <a:r>
-              <a:rPr lang="en-US" sz="1710" kern="1200">
-                <a:solidFill>
-                  <a:schemeClr val="tx1"/>
-                </a:solidFill>
-                <a:latin typeface="+mn-lt"/>
-                <a:ea typeface="+mn-ea"/>
-                <a:cs typeface="+mn-cs"/>
+              <a:rPr lang="en-US" sz="1710" dirty="0">
+                <a:highlight>
+                  <a:srgbClr val="FFFFFF"/>
+                </a:highlight>
+                <a:latin typeface="system-ui"/>
               </a:rPr>
-              <a:t>Next Steps (Potential Further Analyses) </a:t>
-            </a:r>
-            <a:endParaRPr lang="en-US"/>
+              <a:t>This allows us to break into the market with a minimized risk, while entering at a lower price point. With this, we can expand faster to the rest of the country and with additional types of jets once we have solidified our place in the market and gained customer confidence. </a:t>
+            </a:r>
+            <a:endParaRPr lang="en-US" sz="1600" dirty="0"/>
           </a:p>
         </p:txBody>
       </p:sp>
@@ -4174,145 +4573,6 @@
             <a:normAutofit/>
           </a:bodyPr>
           <a:lstStyle/>
-          <a:p>
-            <a:pPr marL="285750" indent="-285750" defTabSz="868680">
-              <a:spcAft>
-                <a:spcPts val="600"/>
-              </a:spcAft>
-              <a:buFont typeface="Arial" panose="020B0604020202020204" pitchFamily="34" charset="0"/>
-              <a:buChar char="•"/>
-            </a:pPr>
-            <a:r>
-              <a:rPr lang="en-US" sz="1710" u="sng" kern="1200" dirty="0">
-                <a:solidFill>
-                  <a:schemeClr val="tx1"/>
-                </a:solidFill>
-                <a:highlight>
-                  <a:srgbClr val="FFFFFF"/>
-                </a:highlight>
-                <a:latin typeface="system-ui"/>
-                <a:ea typeface="+mn-ea"/>
-                <a:cs typeface="+mn-cs"/>
-              </a:rPr>
-              <a:t>Jet Improvement Analysis: </a:t>
-            </a:r>
-            <a:r>
-              <a:rPr lang="en-US" sz="1710" kern="1200" dirty="0">
-                <a:solidFill>
-                  <a:schemeClr val="tx1"/>
-                </a:solidFill>
-                <a:highlight>
-                  <a:srgbClr val="FFFFFF"/>
-                </a:highlight>
-                <a:latin typeface="system-ui"/>
-                <a:ea typeface="+mn-ea"/>
-                <a:cs typeface="+mn-cs"/>
-              </a:rPr>
-              <a:t>Which Jets have improved the most over the years and now have a smaller chance of experiencing a fatal incident?</a:t>
-            </a:r>
-          </a:p>
-          <a:p>
-            <a:pPr marL="285750" indent="-285750" defTabSz="868680">
-              <a:spcAft>
-                <a:spcPts val="600"/>
-              </a:spcAft>
-              <a:buFont typeface="Arial" panose="020B0604020202020204" pitchFamily="34" charset="0"/>
-              <a:buChar char="•"/>
-            </a:pPr>
-            <a:r>
-              <a:rPr lang="en-US" sz="1710" u="sng" kern="1200" dirty="0">
-                <a:solidFill>
-                  <a:schemeClr val="tx1"/>
-                </a:solidFill>
-                <a:highlight>
-                  <a:srgbClr val="FFFFFF"/>
-                </a:highlight>
-                <a:latin typeface="system-ui"/>
-                <a:ea typeface="+mn-ea"/>
-                <a:cs typeface="+mn-cs"/>
-              </a:rPr>
-              <a:t>Flight purpose analysis:</a:t>
-            </a:r>
-            <a:r>
-              <a:rPr lang="en-US" sz="1710" kern="1200" dirty="0">
-                <a:solidFill>
-                  <a:schemeClr val="tx1"/>
-                </a:solidFill>
-                <a:highlight>
-                  <a:srgbClr val="FFFFFF"/>
-                </a:highlight>
-                <a:latin typeface="system-ui"/>
-                <a:ea typeface="+mn-ea"/>
-                <a:cs typeface="+mn-cs"/>
-              </a:rPr>
-              <a:t> This model could display which types of flights are more prone to experiencing fatal incidents.</a:t>
-            </a:r>
-          </a:p>
-          <a:p>
-            <a:pPr marL="285750" indent="-285750" defTabSz="868680">
-              <a:spcAft>
-                <a:spcPts val="600"/>
-              </a:spcAft>
-              <a:buFont typeface="Arial" panose="020B0604020202020204" pitchFamily="34" charset="0"/>
-              <a:buChar char="•"/>
-            </a:pPr>
-            <a:r>
-              <a:rPr lang="en-US" sz="1710" u="sng" kern="1200" dirty="0">
-                <a:solidFill>
-                  <a:schemeClr val="tx1"/>
-                </a:solidFill>
-                <a:highlight>
-                  <a:srgbClr val="FFFFFF"/>
-                </a:highlight>
-                <a:latin typeface="system-ui"/>
-                <a:ea typeface="+mn-ea"/>
-                <a:cs typeface="+mn-cs"/>
-              </a:rPr>
-              <a:t>Risk predictor model:</a:t>
-            </a:r>
-            <a:r>
-              <a:rPr lang="en-US" sz="1710" kern="1200" dirty="0">
-                <a:solidFill>
-                  <a:schemeClr val="tx1"/>
-                </a:solidFill>
-                <a:highlight>
-                  <a:srgbClr val="FFFFFF"/>
-                </a:highlight>
-                <a:latin typeface="system-ui"/>
-                <a:ea typeface="+mn-ea"/>
-                <a:cs typeface="+mn-cs"/>
-              </a:rPr>
-              <a:t> Given details about a potential flight, </a:t>
-            </a:r>
-            <a:r>
-              <a:rPr lang="en-US" sz="1710" kern="1200">
-                <a:solidFill>
-                  <a:schemeClr val="tx1"/>
-                </a:solidFill>
-                <a:highlight>
-                  <a:srgbClr val="FFFFFF"/>
-                </a:highlight>
-                <a:latin typeface="system-ui"/>
-                <a:ea typeface="+mn-ea"/>
-                <a:cs typeface="+mn-cs"/>
-              </a:rPr>
-              <a:t>this model could </a:t>
-            </a:r>
-            <a:r>
-              <a:rPr lang="en-US" sz="1710" kern="1200" dirty="0">
-                <a:solidFill>
-                  <a:schemeClr val="tx1"/>
-                </a:solidFill>
-                <a:highlight>
-                  <a:srgbClr val="FFFFFF"/>
-                </a:highlight>
-                <a:latin typeface="system-ui"/>
-                <a:ea typeface="+mn-ea"/>
-                <a:cs typeface="+mn-cs"/>
-              </a:rPr>
-              <a:t>help predict the level of incident severity a flight could result in.</a:t>
-            </a:r>
-          </a:p>
           <a:p>
             <a:pPr defTabSz="868680">
               <a:spcAft>
@@ -4362,6 +4622,608 @@
     </p:spTree>
     <p:extLst>
       <p:ext uri="{BB962C8B-B14F-4D97-AF65-F5344CB8AC3E}">
+        <p14:creationId xmlns:p14="http://schemas.microsoft.com/office/powerpoint/2010/main" val="3866943622"/>
+      </p:ext>
+    </p:extLst>
+  </p:cSld>
+  <p:clrMapOvr>
+    <a:masterClrMapping/>
+  </p:clrMapOvr>
+</p:sld>
+</file>
+
+<file path=ppt/slides/slide11.xml><?xml version="1.0" encoding="utf-8"?>
+<p:sld xmlns:a="http://schemas.openxmlformats.org/drawingml/2006/main" xmlns:r="http://schemas.openxmlformats.org/officeDocument/2006/relationships" xmlns:p="http://schemas.openxmlformats.org/presentationml/2006/main">
+  <p:cSld>
+    <p:bg>
+      <p:bgPr>
+        <a:solidFill>
+          <a:schemeClr val="bg1"/>
+        </a:solidFill>
+        <a:effectLst/>
+      </p:bgPr>
+    </p:bg>
+    <p:spTree>
+      <p:nvGrpSpPr>
+        <p:cNvPr id="1" name=""/>
+        <p:cNvGrpSpPr/>
+        <p:nvPr/>
+      </p:nvGrpSpPr>
+      <p:grpSpPr>
+        <a:xfrm>
+          <a:off x="0" y="0"/>
+          <a:ext cx="0" cy="0"/>
+          <a:chOff x="0" y="0"/>
+          <a:chExt cx="0" cy="0"/>
+        </a:xfrm>
+      </p:grpSpPr>
+      <p:sp useBgFill="1">
+        <p:nvSpPr>
+          <p:cNvPr id="14" name="Rectangle 13">
+            <a:extLst>
+              <a:ext uri="{FF2B5EF4-FFF2-40B4-BE49-F238E27FC236}">
+                <a16:creationId xmlns:a16="http://schemas.microsoft.com/office/drawing/2014/main" id="{AFF8D2E5-2C4E-47B1-930B-6C82B7C31331}"/>
+              </a:ext>
+              <a:ext uri="{C183D7F6-B498-43B3-948B-1728B52AA6E4}">
+                <adec:decorative xmlns:adec="http://schemas.microsoft.com/office/drawing/2017/decorative" val="1"/>
+              </a:ext>
+            </a:extLst>
+          </p:cNvPr>
+          <p:cNvSpPr>
+            <a:spLocks noGrp="1" noRot="1" noChangeAspect="1" noMove="1" noResize="1" noEditPoints="1" noAdjustHandles="1" noChangeArrowheads="1" noChangeShapeType="1" noTextEdit="1"/>
+          </p:cNvSpPr>
+          <p:nvPr>
+            <p:extLst>
+              <p:ext uri="{386F3935-93C4-4BCD-93E2-E3B085C9AB24}">
+                <p16:designElem xmlns:p16="http://schemas.microsoft.com/office/powerpoint/2015/main" val="1"/>
+              </p:ext>
+            </p:extLst>
+          </p:nvPr>
+        </p:nvSpPr>
+        <p:spPr>
+          <a:xfrm>
+            <a:off x="0" y="0"/>
+            <a:ext cx="12192000" cy="6858000"/>
+          </a:xfrm>
+          <a:prstGeom prst="rect">
+            <a:avLst/>
+          </a:prstGeom>
+          <a:ln>
+            <a:noFill/>
+          </a:ln>
+        </p:spPr>
+        <p:style>
+          <a:lnRef idx="2">
+            <a:schemeClr val="accent1">
+              <a:shade val="50000"/>
+            </a:schemeClr>
+          </a:lnRef>
+          <a:fillRef idx="1">
+            <a:schemeClr val="accent1"/>
+          </a:fillRef>
+          <a:effectRef idx="0">
+            <a:schemeClr val="accent1"/>
+          </a:effectRef>
+          <a:fontRef idx="minor">
+            <a:schemeClr val="lt1"/>
+          </a:fontRef>
+        </p:style>
+        <p:txBody>
+          <a:bodyPr rtlCol="0" anchor="ctr"/>
+          <a:lstStyle/>
+          <a:p>
+            <a:pPr algn="ctr"/>
+            <a:endParaRPr lang="en-US"/>
+          </a:p>
+        </p:txBody>
+      </p:sp>
+      <p:sp>
+        <p:nvSpPr>
+          <p:cNvPr id="5" name="Title 4">
+            <a:extLst>
+              <a:ext uri="{FF2B5EF4-FFF2-40B4-BE49-F238E27FC236}">
+                <a16:creationId xmlns:a16="http://schemas.microsoft.com/office/drawing/2014/main" id="{7471A0B6-DA2B-0EE4-0E32-45953D209B19}"/>
+              </a:ext>
+            </a:extLst>
+          </p:cNvPr>
+          <p:cNvSpPr>
+            <a:spLocks noGrp="1"/>
+          </p:cNvSpPr>
+          <p:nvPr>
+            <p:ph type="title"/>
+          </p:nvPr>
+        </p:nvSpPr>
+        <p:spPr>
+          <a:xfrm>
+            <a:off x="841248" y="251312"/>
+            <a:ext cx="10506456" cy="1010264"/>
+          </a:xfrm>
+        </p:spPr>
+        <p:txBody>
+          <a:bodyPr vert="horz" lIns="91440" tIns="45720" rIns="91440" bIns="45720" rtlCol="0" anchor="ctr">
+            <a:normAutofit/>
+          </a:bodyPr>
+          <a:lstStyle/>
+          <a:p>
+            <a:r>
+              <a:rPr lang="en-US" kern="1200" dirty="0">
+                <a:solidFill>
+                  <a:schemeClr val="tx1"/>
+                </a:solidFill>
+                <a:latin typeface="+mj-lt"/>
+                <a:ea typeface="+mj-ea"/>
+                <a:cs typeface="+mj-cs"/>
+              </a:rPr>
+              <a:t>Next Steps</a:t>
+            </a:r>
+          </a:p>
+        </p:txBody>
+      </p:sp>
+      <p:sp>
+        <p:nvSpPr>
+          <p:cNvPr id="16" name="Rectangle 15">
+            <a:extLst>
+              <a:ext uri="{FF2B5EF4-FFF2-40B4-BE49-F238E27FC236}">
+                <a16:creationId xmlns:a16="http://schemas.microsoft.com/office/drawing/2014/main" id="{801E4ADA-0EA9-4930-846E-3C11E8BED6DD}"/>
+              </a:ext>
+              <a:ext uri="{C183D7F6-B498-43B3-948B-1728B52AA6E4}">
+                <adec:decorative xmlns:adec="http://schemas.microsoft.com/office/drawing/2017/decorative" val="1"/>
+              </a:ext>
+            </a:extLst>
+          </p:cNvPr>
+          <p:cNvSpPr>
+            <a:spLocks noGrp="1" noRot="1" noChangeAspect="1" noMove="1" noResize="1" noEditPoints="1" noAdjustHandles="1" noChangeArrowheads="1" noChangeShapeType="1" noTextEdit="1"/>
+          </p:cNvSpPr>
+          <p:nvPr>
+            <p:extLst>
+              <p:ext uri="{386F3935-93C4-4BCD-93E2-E3B085C9AB24}">
+                <p16:designElem xmlns:p16="http://schemas.microsoft.com/office/powerpoint/2015/main" val="1"/>
+              </p:ext>
+            </p:extLst>
+          </p:nvPr>
+        </p:nvSpPr>
+        <p:spPr>
+          <a:xfrm>
+            <a:off x="0" y="417618"/>
+            <a:ext cx="128016" cy="631415"/>
+          </a:xfrm>
+          <a:prstGeom prst="rect">
+            <a:avLst/>
+          </a:prstGeom>
+          <a:solidFill>
+            <a:schemeClr val="accent2"/>
+          </a:solidFill>
+          <a:ln>
+            <a:noFill/>
+          </a:ln>
+        </p:spPr>
+        <p:style>
+          <a:lnRef idx="2">
+            <a:schemeClr val="accent1">
+              <a:shade val="50000"/>
+            </a:schemeClr>
+          </a:lnRef>
+          <a:fillRef idx="1">
+            <a:schemeClr val="accent1"/>
+          </a:fillRef>
+          <a:effectRef idx="0">
+            <a:schemeClr val="accent1"/>
+          </a:effectRef>
+          <a:fontRef idx="minor">
+            <a:schemeClr val="lt1"/>
+          </a:fontRef>
+        </p:style>
+        <p:txBody>
+          <a:bodyPr rtlCol="0" anchor="ctr"/>
+          <a:lstStyle/>
+          <a:p>
+            <a:pPr marL="0" marR="0" lvl="0" indent="0" algn="ctr" defTabSz="914400" rtl="0" eaLnBrk="1" fontAlgn="auto" latinLnBrk="0" hangingPunct="1">
+              <a:lnSpc>
+                <a:spcPct val="100000"/>
+              </a:lnSpc>
+              <a:spcBef>
+                <a:spcPts val="0"/>
+              </a:spcBef>
+              <a:spcAft>
+                <a:spcPts val="0"/>
+              </a:spcAft>
+              <a:buClrTx/>
+              <a:buSzTx/>
+              <a:buFontTx/>
+              <a:buNone/>
+              <a:tabLst/>
+              <a:defRPr/>
+            </a:pPr>
+            <a:endParaRPr kumimoji="0" lang="en-US" sz="1800" b="0" i="0" u="none" strike="noStrike" kern="1200" cap="none" spc="0" normalizeH="0" baseline="0" noProof="0">
+              <a:ln>
+                <a:noFill/>
+              </a:ln>
+              <a:solidFill>
+                <a:prstClr val="white"/>
+              </a:solidFill>
+              <a:effectLst/>
+              <a:uLnTx/>
+              <a:uFillTx/>
+              <a:latin typeface="Calibri" panose="020F0502020204030204"/>
+              <a:ea typeface="+mn-ea"/>
+              <a:cs typeface="+mn-cs"/>
+            </a:endParaRPr>
+          </a:p>
+        </p:txBody>
+      </p:sp>
+      <p:sp>
+        <p:nvSpPr>
+          <p:cNvPr id="18" name="Rectangle 17">
+            <a:extLst>
+              <a:ext uri="{FF2B5EF4-FFF2-40B4-BE49-F238E27FC236}">
+                <a16:creationId xmlns:a16="http://schemas.microsoft.com/office/drawing/2014/main" id="{FB92FFCE-0C90-454E-AA25-D4EE9A6C39C5}"/>
+              </a:ext>
+              <a:ext uri="{C183D7F6-B498-43B3-948B-1728B52AA6E4}">
+                <adec:decorative xmlns:adec="http://schemas.microsoft.com/office/drawing/2017/decorative" val="1"/>
+              </a:ext>
+            </a:extLst>
+          </p:cNvPr>
+          <p:cNvSpPr>
+            <a:spLocks noGrp="1" noRot="1" noChangeAspect="1" noMove="1" noResize="1" noEditPoints="1" noAdjustHandles="1" noChangeArrowheads="1" noChangeShapeType="1" noTextEdit="1"/>
+          </p:cNvSpPr>
+          <p:nvPr>
+            <p:extLst>
+              <p:ext uri="{386F3935-93C4-4BCD-93E2-E3B085C9AB24}">
+                <p16:designElem xmlns:p16="http://schemas.microsoft.com/office/powerpoint/2015/main" val="1"/>
+              </p:ext>
+            </p:extLst>
+          </p:nvPr>
+        </p:nvSpPr>
+        <p:spPr>
+          <a:xfrm>
+            <a:off x="841248" y="1380864"/>
+            <a:ext cx="10506456" cy="18288"/>
+          </a:xfrm>
+          <a:prstGeom prst="rect">
+            <a:avLst/>
+          </a:prstGeom>
+          <a:solidFill>
+            <a:srgbClr val="D5D5D5"/>
+          </a:solidFill>
+          <a:ln w="3175">
+            <a:noFill/>
+          </a:ln>
+          <a:effectLst/>
+        </p:spPr>
+        <p:style>
+          <a:lnRef idx="2">
+            <a:schemeClr val="accent1">
+              <a:shade val="50000"/>
+            </a:schemeClr>
+          </a:lnRef>
+          <a:fillRef idx="1">
+            <a:schemeClr val="accent1"/>
+          </a:fillRef>
+          <a:effectRef idx="0">
+            <a:schemeClr val="accent1"/>
+          </a:effectRef>
+          <a:fontRef idx="minor">
+            <a:schemeClr val="lt1"/>
+          </a:fontRef>
+        </p:style>
+        <p:txBody>
+          <a:bodyPr rtlCol="0" anchor="ctr"/>
+          <a:lstStyle/>
+          <a:p>
+            <a:pPr algn="ctr"/>
+            <a:endParaRPr lang="en-US">
+              <a:solidFill>
+                <a:prstClr val="white"/>
+              </a:solidFill>
+              <a:latin typeface="Calibri" panose="020F0502020204030204"/>
+            </a:endParaRPr>
+          </a:p>
+        </p:txBody>
+      </p:sp>
+      <p:sp>
+        <p:nvSpPr>
+          <p:cNvPr id="8" name="Text Placeholder 7">
+            <a:extLst>
+              <a:ext uri="{FF2B5EF4-FFF2-40B4-BE49-F238E27FC236}">
+                <a16:creationId xmlns:a16="http://schemas.microsoft.com/office/drawing/2014/main" id="{638E6817-6B13-A977-1D38-35FB1C174F57}"/>
+              </a:ext>
+            </a:extLst>
+          </p:cNvPr>
+          <p:cNvSpPr>
+            <a:spLocks/>
+          </p:cNvSpPr>
+          <p:nvPr/>
+        </p:nvSpPr>
+        <p:spPr>
+          <a:xfrm>
+            <a:off x="841248" y="1971773"/>
+            <a:ext cx="5404556" cy="788296"/>
+          </a:xfrm>
+          <a:prstGeom prst="rect">
+            <a:avLst/>
+          </a:prstGeom>
+        </p:spPr>
+        <p:txBody>
+          <a:bodyPr/>
+          <a:lstStyle/>
+          <a:p>
+            <a:pPr defTabSz="868680">
+              <a:spcAft>
+                <a:spcPts val="600"/>
+              </a:spcAft>
+            </a:pPr>
+            <a:r>
+              <a:rPr lang="en-US" sz="1710" kern="1200" dirty="0">
+                <a:solidFill>
+                  <a:schemeClr val="tx1"/>
+                </a:solidFill>
+                <a:latin typeface="+mn-lt"/>
+                <a:ea typeface="+mn-ea"/>
+                <a:cs typeface="+mn-cs"/>
+              </a:rPr>
+              <a:t>Next Steps (Potential Further Analyses) </a:t>
+            </a:r>
+            <a:endParaRPr lang="en-US" dirty="0"/>
+          </a:p>
+        </p:txBody>
+      </p:sp>
+      <p:sp>
+        <p:nvSpPr>
+          <p:cNvPr id="9" name="Content Placeholder 8">
+            <a:extLst>
+              <a:ext uri="{FF2B5EF4-FFF2-40B4-BE49-F238E27FC236}">
+                <a16:creationId xmlns:a16="http://schemas.microsoft.com/office/drawing/2014/main" id="{45C15388-EFDB-238F-6E67-8014D4BE5AD6}"/>
+              </a:ext>
+            </a:extLst>
+          </p:cNvPr>
+          <p:cNvSpPr>
+            <a:spLocks/>
+          </p:cNvSpPr>
+          <p:nvPr/>
+        </p:nvSpPr>
+        <p:spPr>
+          <a:xfrm>
+            <a:off x="841249" y="2760069"/>
+            <a:ext cx="5252403" cy="3525310"/>
+          </a:xfrm>
+          <a:prstGeom prst="rect">
+            <a:avLst/>
+          </a:prstGeom>
+        </p:spPr>
+        <p:txBody>
+          <a:bodyPr>
+            <a:normAutofit/>
+          </a:bodyPr>
+          <a:lstStyle/>
+          <a:p>
+            <a:pPr marL="285750" indent="-285750" defTabSz="868680">
+              <a:spcAft>
+                <a:spcPts val="600"/>
+              </a:spcAft>
+              <a:buFont typeface="Arial" panose="020B0604020202020204" pitchFamily="34" charset="0"/>
+              <a:buChar char="•"/>
+            </a:pPr>
+            <a:r>
+              <a:rPr lang="en-US" sz="1710" u="sng" kern="1200" dirty="0">
+                <a:solidFill>
+                  <a:schemeClr val="tx1"/>
+                </a:solidFill>
+                <a:highlight>
+                  <a:srgbClr val="FFFFFF"/>
+                </a:highlight>
+                <a:latin typeface="system-ui"/>
+                <a:ea typeface="+mn-ea"/>
+                <a:cs typeface="+mn-cs"/>
+              </a:rPr>
+              <a:t>Jet </a:t>
+            </a:r>
+            <a:r>
+              <a:rPr lang="en-US" sz="1710" u="sng" dirty="0">
+                <a:highlight>
+                  <a:srgbClr val="FFFFFF"/>
+                </a:highlight>
+                <a:latin typeface="system-ui"/>
+              </a:rPr>
+              <a:t>I</a:t>
+            </a:r>
+            <a:r>
+              <a:rPr lang="en-US" sz="1710" u="sng" kern="1200" dirty="0">
+                <a:solidFill>
+                  <a:schemeClr val="tx1"/>
+                </a:solidFill>
+                <a:highlight>
+                  <a:srgbClr val="FFFFFF"/>
+                </a:highlight>
+                <a:latin typeface="system-ui"/>
+                <a:ea typeface="+mn-ea"/>
+                <a:cs typeface="+mn-cs"/>
+              </a:rPr>
+              <a:t>mprovement Analysis: </a:t>
+            </a:r>
+            <a:r>
+              <a:rPr lang="en-US" sz="1710" kern="1200" dirty="0">
+                <a:solidFill>
+                  <a:schemeClr val="tx1"/>
+                </a:solidFill>
+                <a:highlight>
+                  <a:srgbClr val="FFFFFF"/>
+                </a:highlight>
+                <a:latin typeface="system-ui"/>
+                <a:ea typeface="+mn-ea"/>
+                <a:cs typeface="+mn-cs"/>
+              </a:rPr>
+              <a:t>Which Jets have improved the most over the years and now have a smaller chance of experiencing a fatal incident?</a:t>
+            </a:r>
+          </a:p>
+          <a:p>
+            <a:pPr marL="285750" indent="-285750" defTabSz="868680">
+              <a:spcAft>
+                <a:spcPts val="600"/>
+              </a:spcAft>
+              <a:buFont typeface="Arial" panose="020B0604020202020204" pitchFamily="34" charset="0"/>
+              <a:buChar char="•"/>
+            </a:pPr>
+            <a:r>
+              <a:rPr lang="en-US" sz="1710" u="sng" kern="1200" dirty="0">
+                <a:solidFill>
+                  <a:schemeClr val="tx1"/>
+                </a:solidFill>
+                <a:highlight>
+                  <a:srgbClr val="FFFFFF"/>
+                </a:highlight>
+                <a:latin typeface="system-ui"/>
+                <a:ea typeface="+mn-ea"/>
+                <a:cs typeface="+mn-cs"/>
+              </a:rPr>
+              <a:t>Flight Purpose </a:t>
+            </a:r>
+            <a:r>
+              <a:rPr lang="en-US" sz="1710" u="sng" dirty="0">
+                <a:highlight>
+                  <a:srgbClr val="FFFFFF"/>
+                </a:highlight>
+                <a:latin typeface="system-ui"/>
+              </a:rPr>
+              <a:t>A</a:t>
+            </a:r>
+            <a:r>
+              <a:rPr lang="en-US" sz="1710" u="sng" kern="1200" dirty="0">
+                <a:solidFill>
+                  <a:schemeClr val="tx1"/>
+                </a:solidFill>
+                <a:highlight>
+                  <a:srgbClr val="FFFFFF"/>
+                </a:highlight>
+                <a:latin typeface="system-ui"/>
+                <a:ea typeface="+mn-ea"/>
+                <a:cs typeface="+mn-cs"/>
+              </a:rPr>
+              <a:t>nalysis:</a:t>
+            </a:r>
+            <a:r>
+              <a:rPr lang="en-US" sz="1710" kern="1200" dirty="0">
+                <a:solidFill>
+                  <a:schemeClr val="tx1"/>
+                </a:solidFill>
+                <a:highlight>
+                  <a:srgbClr val="FFFFFF"/>
+                </a:highlight>
+                <a:latin typeface="system-ui"/>
+                <a:ea typeface="+mn-ea"/>
+                <a:cs typeface="+mn-cs"/>
+              </a:rPr>
+              <a:t> This model could display which types of flights are more prone to experiencing fatal incidents.</a:t>
+            </a:r>
+          </a:p>
+          <a:p>
+            <a:pPr marL="285750" indent="-285750" defTabSz="868680">
+              <a:spcAft>
+                <a:spcPts val="600"/>
+              </a:spcAft>
+              <a:buFont typeface="Arial" panose="020B0604020202020204" pitchFamily="34" charset="0"/>
+              <a:buChar char="•"/>
+            </a:pPr>
+            <a:r>
+              <a:rPr lang="en-US" sz="1710" u="sng" kern="1200" dirty="0">
+                <a:solidFill>
+                  <a:schemeClr val="tx1"/>
+                </a:solidFill>
+                <a:highlight>
+                  <a:srgbClr val="FFFFFF"/>
+                </a:highlight>
+                <a:latin typeface="system-ui"/>
+                <a:ea typeface="+mn-ea"/>
+                <a:cs typeface="+mn-cs"/>
+              </a:rPr>
+              <a:t>Risk </a:t>
+            </a:r>
+            <a:r>
+              <a:rPr lang="en-US" sz="1710" u="sng" dirty="0">
+                <a:highlight>
+                  <a:srgbClr val="FFFFFF"/>
+                </a:highlight>
+                <a:latin typeface="system-ui"/>
+              </a:rPr>
+              <a:t>P</a:t>
+            </a:r>
+            <a:r>
+              <a:rPr lang="en-US" sz="1710" u="sng" kern="1200" dirty="0">
+                <a:solidFill>
+                  <a:schemeClr val="tx1"/>
+                </a:solidFill>
+                <a:highlight>
+                  <a:srgbClr val="FFFFFF"/>
+                </a:highlight>
+                <a:latin typeface="system-ui"/>
+                <a:ea typeface="+mn-ea"/>
+                <a:cs typeface="+mn-cs"/>
+              </a:rPr>
+              <a:t>redictor Model:</a:t>
+            </a:r>
+            <a:r>
+              <a:rPr lang="en-US" sz="1710" kern="1200" dirty="0">
+                <a:solidFill>
+                  <a:schemeClr val="tx1"/>
+                </a:solidFill>
+                <a:highlight>
+                  <a:srgbClr val="FFFFFF"/>
+                </a:highlight>
+                <a:latin typeface="system-ui"/>
+                <a:ea typeface="+mn-ea"/>
+                <a:cs typeface="+mn-cs"/>
+              </a:rPr>
+              <a:t> Given details about a potential flight, this model could help predict the level of incident severity a flight could result in.</a:t>
+            </a:r>
+          </a:p>
+          <a:p>
+            <a:pPr defTabSz="868680">
+              <a:spcAft>
+                <a:spcPts val="600"/>
+              </a:spcAft>
+            </a:pPr>
+            <a:endParaRPr lang="en-US" sz="1710" kern="1200" dirty="0">
+              <a:solidFill>
+                <a:schemeClr val="tx1"/>
+              </a:solidFill>
+              <a:highlight>
+                <a:srgbClr val="FFFFFF"/>
+              </a:highlight>
+              <a:latin typeface="system-ui"/>
+              <a:ea typeface="+mn-ea"/>
+              <a:cs typeface="+mn-cs"/>
+            </a:endParaRPr>
+          </a:p>
+          <a:p>
+            <a:pPr defTabSz="868680">
+              <a:spcAft>
+                <a:spcPts val="600"/>
+              </a:spcAft>
+            </a:pPr>
+            <a:endParaRPr lang="en-US" sz="1710" kern="1200" dirty="0">
+              <a:solidFill>
+                <a:schemeClr val="tx1"/>
+              </a:solidFill>
+              <a:highlight>
+                <a:srgbClr val="FFFFFF"/>
+              </a:highlight>
+              <a:latin typeface="system-ui"/>
+              <a:ea typeface="+mn-ea"/>
+              <a:cs typeface="+mn-cs"/>
+            </a:endParaRPr>
+          </a:p>
+          <a:p>
+            <a:pPr>
+              <a:spcAft>
+                <a:spcPts val="600"/>
+              </a:spcAft>
+            </a:pPr>
+            <a:endParaRPr lang="en-US" dirty="0"/>
+          </a:p>
+        </p:txBody>
+      </p:sp>
+    </p:spTree>
+    <p:extLst>
+      <p:ext uri="{BB962C8B-B14F-4D97-AF65-F5344CB8AC3E}">
         <p14:creationId xmlns:p14="http://schemas.microsoft.com/office/powerpoint/2010/main" val="986175211"/>
       </p:ext>
     </p:extLst>
@@ -4372,7 +5234,7 @@
 </p:sld>
 </file>
 
-<file path=ppt/slides/slide11.xml><?xml version="1.0" encoding="utf-8"?>
+<file path=ppt/slides/slide12.xml><?xml version="1.0" encoding="utf-8"?>
 <p:sld xmlns:a="http://schemas.openxmlformats.org/drawingml/2006/main" xmlns:r="http://schemas.openxmlformats.org/officeDocument/2006/relationships" xmlns:p="http://schemas.openxmlformats.org/presentationml/2006/main">
   <p:cSld>
     <p:bg>
@@ -6115,7 +6977,7 @@
             </a:r>
             <a:r>
               <a:rPr lang="en-US" sz="1700" dirty="0"/>
-              <a:t>Data Cleaning, Engineering, and Analysis</a:t>
+              <a:t>Data Cleaning, Feature Engineering, and Analysis</a:t>
             </a:r>
           </a:p>
           <a:p>
@@ -7005,7 +7867,7 @@
           <a:lstStyle/>
           <a:p>
             <a:r>
-              <a:rPr lang="en-US" kern="1200">
+              <a:rPr lang="en-US" kern="1200" dirty="0">
                 <a:solidFill>
                   <a:schemeClr val="tx1"/>
                 </a:solidFill>
@@ -7013,7 +7875,7 @@
                 <a:ea typeface="+mj-ea"/>
                 <a:cs typeface="+mj-cs"/>
               </a:rPr>
-              <a:t>Data Used and Limitations</a:t>
+              <a:t>Data Used and Data Limitations</a:t>
             </a:r>
           </a:p>
         </p:txBody>
@@ -11025,4 +11887,319 @@
     </a:ext>
   </a:extLst>
 </a:theme>
+</file>
+
+<file path=ppt/theme/theme2.xml><?xml version="1.0" encoding="utf-8"?>
+<a:theme xmlns:a="http://schemas.openxmlformats.org/drawingml/2006/main" name="Office Theme">
+  <a:themeElements>
+    <a:clrScheme name="Office">
+      <a:dk1>
+        <a:sysClr val="windowText" lastClr="000000"/>
+      </a:dk1>
+      <a:lt1>
+        <a:sysClr val="window" lastClr="FFFFFF"/>
+      </a:lt1>
+      <a:dk2>
+        <a:srgbClr val="0E2841"/>
+      </a:dk2>
+      <a:lt2>
+        <a:srgbClr val="E8E8E8"/>
+      </a:lt2>
+      <a:accent1>
+        <a:srgbClr val="156082"/>
+      </a:accent1>
+      <a:accent2>
+        <a:srgbClr val="E97132"/>
+      </a:accent2>
+      <a:accent3>
+        <a:srgbClr val="196B24"/>
+      </a:accent3>
+      <a:accent4>
+        <a:srgbClr val="0F9ED5"/>
+      </a:accent4>
+      <a:accent5>
+        <a:srgbClr val="A02B93"/>
+      </a:accent5>
+      <a:accent6>
+        <a:srgbClr val="4EA72E"/>
+      </a:accent6>
+      <a:hlink>
+        <a:srgbClr val="467886"/>
+      </a:hlink>
+      <a:folHlink>
+        <a:srgbClr val="96607D"/>
+      </a:folHlink>
+    </a:clrScheme>
+    <a:fontScheme name="Office">
+      <a:majorFont>
+        <a:latin typeface="Aptos Display" panose="02110004020202020204"/>
+        <a:ea typeface=""/>
+        <a:cs typeface=""/>
+        <a:font script="Jpan" typeface="游ゴシック Light"/>
+        <a:font script="Hang" typeface="맑은 고딕"/>
+        <a:font script="Hans" typeface="等线 Light"/>
+        <a:font script="Hant" typeface="新細明體"/>
+        <a:font script="Arab" typeface="Times New Roman"/>
+        <a:font script="Hebr" typeface="Times New Roman"/>
+        <a:font script="Thai" typeface="Angsana New"/>
+        <a:font script="Ethi" typeface="Nyala"/>
+        <a:font script="Beng" typeface="Vrinda"/>
+        <a:font script="Gujr" typeface="Shruti"/>
+        <a:font script="Khmr" typeface="MoolBoran"/>
+        <a:font script="Knda" typeface="Tunga"/>
+        <a:font script="Guru" typeface="Raavi"/>
+        <a:font script="Cans" typeface="Euphemia"/>
+        <a:font script="Cher" typeface="Plantagenet Cherokee"/>
+        <a:font script="Yiii" typeface="Microsoft Yi Baiti"/>
+        <a:font script="Tibt" typeface="Microsoft Himalaya"/>
+        <a:font script="Thaa" typeface="MV Boli"/>
+        <a:font script="Deva" typeface="Mangal"/>
+        <a:font script="Telu" typeface="Gautami"/>
+        <a:font script="Taml" typeface="Latha"/>
+        <a:font script="Syrc" typeface="Estrangelo Edessa"/>
+        <a:font script="Orya" typeface="Kalinga"/>
+        <a:font script="Mlym" typeface="Kartika"/>
+        <a:font script="Laoo" typeface="DokChampa"/>
+        <a:font script="Sinh" typeface="Iskoola Pota"/>
+        <a:font script="Mong" typeface="Mongolian Baiti"/>
+        <a:font script="Viet" typeface="Times New Roman"/>
+        <a:font script="Uigh" typeface="Microsoft Uighur"/>
+        <a:font script="Geor" typeface="Sylfaen"/>
+        <a:font script="Armn" typeface="Arial"/>
+        <a:font script="Bugi" typeface="Leelawadee UI"/>
+        <a:font script="Bopo" typeface="Microsoft JhengHei"/>
+        <a:font script="Java" typeface="Javanese Text"/>
+        <a:font script="Lisu" typeface="Segoe UI"/>
+        <a:font script="Mymr" typeface="Myanmar Text"/>
+        <a:font script="Nkoo" typeface="Ebrima"/>
+        <a:font script="Olck" typeface="Nirmala UI"/>
+        <a:font script="Osma" typeface="Ebrima"/>
+        <a:font script="Phag" typeface="Phagspa"/>
+        <a:font script="Syrn" typeface="Estrangelo Edessa"/>
+        <a:font script="Syrj" typeface="Estrangelo Edessa"/>
+        <a:font script="Syre" typeface="Estrangelo Edessa"/>
+        <a:font script="Sora" typeface="Nirmala UI"/>
+        <a:font script="Tale" typeface="Microsoft Tai Le"/>
+        <a:font script="Talu" typeface="Microsoft New Tai Lue"/>
+        <a:font script="Tfng" typeface="Ebrima"/>
+      </a:majorFont>
+      <a:minorFont>
+        <a:latin typeface="Aptos" panose="02110004020202020204"/>
+        <a:ea typeface=""/>
+        <a:cs typeface=""/>
+        <a:font script="Jpan" typeface="游ゴシック"/>
+        <a:font script="Hang" typeface="맑은 고딕"/>
+        <a:font script="Hans" typeface="等线"/>
+        <a:font script="Hant" typeface="新細明體"/>
+        <a:font script="Arab" typeface="Arial"/>
+        <a:font script="Hebr" typeface="Arial"/>
+        <a:font script="Thai" typeface="Cordia New"/>
+        <a:font script="Ethi" typeface="Nyala"/>
+        <a:font script="Beng" typeface="Vrinda"/>
+        <a:font script="Gujr" typeface="Shruti"/>
+        <a:font script="Khmr" typeface="DaunPenh"/>
+        <a:font script="Knda" typeface="Tunga"/>
+        <a:font script="Guru" typeface="Raavi"/>
+        <a:font script="Cans" typeface="Euphemia"/>
+        <a:font script="Cher" typeface="Plantagenet Cherokee"/>
+        <a:font script="Yiii" typeface="Microsoft Yi Baiti"/>
+        <a:font script="Tibt" typeface="Microsoft Himalaya"/>
+        <a:font script="Thaa" typeface="MV Boli"/>
+        <a:font script="Deva" typeface="Mangal"/>
+        <a:font script="Telu" typeface="Gautami"/>
+        <a:font script="Taml" typeface="Latha"/>
+        <a:font script="Syrc" typeface="Estrangelo Edessa"/>
+        <a:font script="Orya" typeface="Kalinga"/>
+        <a:font script="Mlym" typeface="Kartika"/>
+        <a:font script="Laoo" typeface="DokChampa"/>
+        <a:font script="Sinh" typeface="Iskoola Pota"/>
+        <a:font script="Mong" typeface="Mongolian Baiti"/>
+        <a:font script="Viet" typeface="Arial"/>
+        <a:font script="Uigh" typeface="Microsoft Uighur"/>
+        <a:font script="Geor" typeface="Sylfaen"/>
+        <a:font script="Armn" typeface="Arial"/>
+        <a:font script="Bugi" typeface="Leelawadee UI"/>
+        <a:font script="Bopo" typeface="Microsoft JhengHei"/>
+        <a:font script="Java" typeface="Javanese Text"/>
+        <a:font script="Lisu" typeface="Segoe UI"/>
+        <a:font script="Mymr" typeface="Myanmar Text"/>
+        <a:font script="Nkoo" typeface="Ebrima"/>
+        <a:font script="Olck" typeface="Nirmala UI"/>
+        <a:font script="Osma" typeface="Ebrima"/>
+        <a:font script="Phag" typeface="Phagspa"/>
+        <a:font script="Syrn" typeface="Estrangelo Edessa"/>
+        <a:font script="Syrj" typeface="Estrangelo Edessa"/>
+        <a:font script="Syre" typeface="Estrangelo Edessa"/>
+        <a:font script="Sora" typeface="Nirmala UI"/>
+        <a:font script="Tale" typeface="Microsoft Tai Le"/>
+        <a:font script="Talu" typeface="Microsoft New Tai Lue"/>
+        <a:font script="Tfng" typeface="Ebrima"/>
+      </a:minorFont>
+    </a:fontScheme>
+    <a:fmtScheme name="Office">
+      <a:fillStyleLst>
+        <a:solidFill>
+          <a:schemeClr val="phClr"/>
+        </a:solidFill>
+        <a:gradFill rotWithShape="1">
+          <a:gsLst>
+            <a:gs pos="0">
+              <a:schemeClr val="phClr">
+                <a:lumMod val="110000"/>
+                <a:satMod val="105000"/>
+                <a:tint val="67000"/>
+              </a:schemeClr>
+            </a:gs>
+            <a:gs pos="50000">
+              <a:schemeClr val="phClr">
+                <a:lumMod val="105000"/>
+                <a:satMod val="103000"/>
+                <a:tint val="73000"/>
+              </a:schemeClr>
+            </a:gs>
+            <a:gs pos="100000">
+              <a:schemeClr val="phClr">
+                <a:lumMod val="105000"/>
+                <a:satMod val="109000"/>
+                <a:tint val="81000"/>
+              </a:schemeClr>
+            </a:gs>
+          </a:gsLst>
+          <a:lin ang="5400000" scaled="0"/>
+        </a:gradFill>
+        <a:gradFill rotWithShape="1">
+          <a:gsLst>
+            <a:gs pos="0">
+              <a:schemeClr val="phClr">
+                <a:satMod val="103000"/>
+                <a:lumMod val="102000"/>
+                <a:tint val="94000"/>
+              </a:schemeClr>
+            </a:gs>
+            <a:gs pos="50000">
+              <a:schemeClr val="phClr">
+                <a:satMod val="110000"/>
+                <a:lumMod val="100000"/>
+                <a:shade val="100000"/>
+              </a:schemeClr>
+            </a:gs>
+            <a:gs pos="100000">
+              <a:schemeClr val="phClr">
+                <a:lumMod val="99000"/>
+                <a:satMod val="120000"/>
+                <a:shade val="78000"/>
+              </a:schemeClr>
+            </a:gs>
+          </a:gsLst>
+          <a:lin ang="5400000" scaled="0"/>
+        </a:gradFill>
+      </a:fillStyleLst>
+      <a:lnStyleLst>
+        <a:ln w="12700" cap="flat" cmpd="sng" algn="ctr">
+          <a:solidFill>
+            <a:schemeClr val="phClr"/>
+          </a:solidFill>
+          <a:prstDash val="solid"/>
+          <a:miter lim="800000"/>
+        </a:ln>
+        <a:ln w="19050" cap="flat" cmpd="sng" algn="ctr">
+          <a:solidFill>
+            <a:schemeClr val="phClr"/>
+          </a:solidFill>
+          <a:prstDash val="solid"/>
+          <a:miter lim="800000"/>
+        </a:ln>
+        <a:ln w="25400" cap="flat" cmpd="sng" algn="ctr">
+          <a:solidFill>
+            <a:schemeClr val="phClr"/>
+          </a:solidFill>
+          <a:prstDash val="solid"/>
+          <a:miter lim="800000"/>
+        </a:ln>
+      </a:lnStyleLst>
+      <a:effectStyleLst>
+        <a:effectStyle>
+          <a:effectLst/>
+        </a:effectStyle>
+        <a:effectStyle>
+          <a:effectLst/>
+        </a:effectStyle>
+        <a:effectStyle>
+          <a:effectLst>
+            <a:outerShdw blurRad="57150" dist="19050" dir="5400000" algn="ctr" rotWithShape="0">
+              <a:srgbClr val="000000">
+                <a:alpha val="63000"/>
+              </a:srgbClr>
+            </a:outerShdw>
+          </a:effectLst>
+        </a:effectStyle>
+      </a:effectStyleLst>
+      <a:bgFillStyleLst>
+        <a:solidFill>
+          <a:schemeClr val="phClr"/>
+        </a:solidFill>
+        <a:solidFill>
+          <a:schemeClr val="phClr">
+            <a:tint val="95000"/>
+            <a:satMod val="170000"/>
+          </a:schemeClr>
+        </a:solidFill>
+        <a:gradFill rotWithShape="1">
+          <a:gsLst>
+            <a:gs pos="0">
+              <a:schemeClr val="phClr">
+                <a:tint val="93000"/>
+                <a:satMod val="150000"/>
+                <a:shade val="98000"/>
+                <a:lumMod val="102000"/>
+              </a:schemeClr>
+            </a:gs>
+            <a:gs pos="50000">
+              <a:schemeClr val="phClr">
+                <a:tint val="98000"/>
+                <a:satMod val="130000"/>
+                <a:shade val="90000"/>
+                <a:lumMod val="103000"/>
+              </a:schemeClr>
+            </a:gs>
+            <a:gs pos="100000">
+              <a:schemeClr val="phClr">
+                <a:shade val="63000"/>
+                <a:satMod val="120000"/>
+              </a:schemeClr>
+            </a:gs>
+          </a:gsLst>
+          <a:lin ang="5400000" scaled="0"/>
+        </a:gradFill>
+      </a:bgFillStyleLst>
+    </a:fmtScheme>
+  </a:themeElements>
+  <a:objectDefaults>
+    <a:lnDef>
+      <a:spPr/>
+      <a:bodyPr/>
+      <a:lstStyle/>
+      <a:style>
+        <a:lnRef idx="2">
+          <a:schemeClr val="accent1"/>
+        </a:lnRef>
+        <a:fillRef idx="0">
+          <a:schemeClr val="accent1"/>
+        </a:fillRef>
+        <a:effectRef idx="1">
+          <a:schemeClr val="accent1"/>
+        </a:effectRef>
+        <a:fontRef idx="minor">
+          <a:schemeClr val="tx1"/>
+        </a:fontRef>
+      </a:style>
+    </a:lnDef>
+  </a:objectDefaults>
+  <a:extraClrSchemeLst/>
+  <a:extLst>
+    <a:ext uri="{05A4C25C-085E-4340-85A3-A5531E510DB2}">
+      <thm15:themeFamily xmlns:thm15="http://schemas.microsoft.com/office/thememl/2012/main" name="Office Theme" id="{2E142A2C-CD16-42D6-873A-C26D2A0506FA}" vid="{1BDDFF52-6CD6-40A5-AB3C-68EB2F1E4D0A}"/>
+    </a:ext>
+  </a:extLst>
+</a:theme>
 </file>
</xml_diff>